<commit_message>
ListView image upload success
</commit_message>
<xml_diff>
--- a/MNU_restaurant/소개.pptx
+++ b/MNU_restaurant/소개.pptx
@@ -111,6 +111,11 @@
       </a:defRPr>
     </a:lvl9pPr>
   </p:defaultTextStyle>
+  <p:extLst>
+    <p:ext uri="{EFAFB233-063F-42B5-8137-9DF3F51BA10A}">
+      <p15:sldGuideLst xmlns:p15="http://schemas.microsoft.com/office/powerpoint/2012/main"/>
+    </p:ext>
+  </p:extLst>
 </p:presentation>
 </file>
 
@@ -245,7 +250,7 @@
           <a:p>
             <a:fld id="{4161AC77-0E9B-4524-AC53-6AE8E85599D9}" type="datetimeFigureOut">
               <a:rPr lang="ko-KR" altLang="en-US" smtClean="0"/>
-              <a:t>2017-10-27</a:t>
+              <a:t>2017-11-01</a:t>
             </a:fld>
             <a:endParaRPr lang="ko-KR" altLang="en-US"/>
           </a:p>
@@ -415,7 +420,7 @@
           <a:p>
             <a:fld id="{4161AC77-0E9B-4524-AC53-6AE8E85599D9}" type="datetimeFigureOut">
               <a:rPr lang="ko-KR" altLang="en-US" smtClean="0"/>
-              <a:t>2017-10-27</a:t>
+              <a:t>2017-11-01</a:t>
             </a:fld>
             <a:endParaRPr lang="ko-KR" altLang="en-US"/>
           </a:p>
@@ -595,7 +600,7 @@
           <a:p>
             <a:fld id="{4161AC77-0E9B-4524-AC53-6AE8E85599D9}" type="datetimeFigureOut">
               <a:rPr lang="ko-KR" altLang="en-US" smtClean="0"/>
-              <a:t>2017-10-27</a:t>
+              <a:t>2017-11-01</a:t>
             </a:fld>
             <a:endParaRPr lang="ko-KR" altLang="en-US"/>
           </a:p>
@@ -765,7 +770,7 @@
           <a:p>
             <a:fld id="{4161AC77-0E9B-4524-AC53-6AE8E85599D9}" type="datetimeFigureOut">
               <a:rPr lang="ko-KR" altLang="en-US" smtClean="0"/>
-              <a:t>2017-10-27</a:t>
+              <a:t>2017-11-01</a:t>
             </a:fld>
             <a:endParaRPr lang="ko-KR" altLang="en-US"/>
           </a:p>
@@ -1011,7 +1016,7 @@
           <a:p>
             <a:fld id="{4161AC77-0E9B-4524-AC53-6AE8E85599D9}" type="datetimeFigureOut">
               <a:rPr lang="ko-KR" altLang="en-US" smtClean="0"/>
-              <a:t>2017-10-27</a:t>
+              <a:t>2017-11-01</a:t>
             </a:fld>
             <a:endParaRPr lang="ko-KR" altLang="en-US"/>
           </a:p>
@@ -1243,7 +1248,7 @@
           <a:p>
             <a:fld id="{4161AC77-0E9B-4524-AC53-6AE8E85599D9}" type="datetimeFigureOut">
               <a:rPr lang="ko-KR" altLang="en-US" smtClean="0"/>
-              <a:t>2017-10-27</a:t>
+              <a:t>2017-11-01</a:t>
             </a:fld>
             <a:endParaRPr lang="ko-KR" altLang="en-US"/>
           </a:p>
@@ -1610,7 +1615,7 @@
           <a:p>
             <a:fld id="{4161AC77-0E9B-4524-AC53-6AE8E85599D9}" type="datetimeFigureOut">
               <a:rPr lang="ko-KR" altLang="en-US" smtClean="0"/>
-              <a:t>2017-10-27</a:t>
+              <a:t>2017-11-01</a:t>
             </a:fld>
             <a:endParaRPr lang="ko-KR" altLang="en-US"/>
           </a:p>
@@ -1728,7 +1733,7 @@
           <a:p>
             <a:fld id="{4161AC77-0E9B-4524-AC53-6AE8E85599D9}" type="datetimeFigureOut">
               <a:rPr lang="ko-KR" altLang="en-US" smtClean="0"/>
-              <a:t>2017-10-27</a:t>
+              <a:t>2017-11-01</a:t>
             </a:fld>
             <a:endParaRPr lang="ko-KR" altLang="en-US"/>
           </a:p>
@@ -1823,7 +1828,7 @@
           <a:p>
             <a:fld id="{4161AC77-0E9B-4524-AC53-6AE8E85599D9}" type="datetimeFigureOut">
               <a:rPr lang="ko-KR" altLang="en-US" smtClean="0"/>
-              <a:t>2017-10-27</a:t>
+              <a:t>2017-11-01</a:t>
             </a:fld>
             <a:endParaRPr lang="ko-KR" altLang="en-US"/>
           </a:p>
@@ -2100,7 +2105,7 @@
           <a:p>
             <a:fld id="{4161AC77-0E9B-4524-AC53-6AE8E85599D9}" type="datetimeFigureOut">
               <a:rPr lang="ko-KR" altLang="en-US" smtClean="0"/>
-              <a:t>2017-10-27</a:t>
+              <a:t>2017-11-01</a:t>
             </a:fld>
             <a:endParaRPr lang="ko-KR" altLang="en-US"/>
           </a:p>
@@ -2353,7 +2358,7 @@
           <a:p>
             <a:fld id="{4161AC77-0E9B-4524-AC53-6AE8E85599D9}" type="datetimeFigureOut">
               <a:rPr lang="ko-KR" altLang="en-US" smtClean="0"/>
-              <a:t>2017-10-27</a:t>
+              <a:t>2017-11-01</a:t>
             </a:fld>
             <a:endParaRPr lang="ko-KR" altLang="en-US"/>
           </a:p>
@@ -2566,7 +2571,7 @@
           <a:p>
             <a:fld id="{4161AC77-0E9B-4524-AC53-6AE8E85599D9}" type="datetimeFigureOut">
               <a:rPr lang="ko-KR" altLang="en-US" smtClean="0"/>
-              <a:t>2017-10-27</a:t>
+              <a:t>2017-11-01</a:t>
             </a:fld>
             <a:endParaRPr lang="ko-KR" altLang="en-US"/>
           </a:p>
@@ -5906,9 +5911,294 @@
           <a:chExt cx="0" cy="0"/>
         </a:xfrm>
       </p:grpSpPr>
+      <p:sp>
+        <p:nvSpPr>
+          <p:cNvPr id="5" name="직사각형 4"/>
+          <p:cNvSpPr/>
+          <p:nvPr/>
+        </p:nvSpPr>
+        <p:spPr>
+          <a:xfrm>
+            <a:off x="7435648" y="457200"/>
+            <a:ext cx="6096000" cy="3637919"/>
+          </a:xfrm>
+          <a:prstGeom prst="rect">
+            <a:avLst/>
+          </a:prstGeom>
+        </p:spPr>
+        <p:txBody>
+          <a:bodyPr>
+            <a:spAutoFit/>
+          </a:bodyPr>
+          <a:lstStyle/>
+          <a:p>
+            <a:pPr algn="just" fontAlgn="base">
+              <a:lnSpc>
+                <a:spcPct val="160000"/>
+              </a:lnSpc>
+            </a:pPr>
+            <a:r>
+              <a:rPr lang="en-US" altLang="ko-KR" b="1" kern="0" dirty="0">
+                <a:solidFill>
+                  <a:srgbClr val="000000"/>
+                </a:solidFill>
+                <a:latin typeface="굴림" panose="020B0600000101010101" pitchFamily="50" charset="-127"/>
+                <a:ea typeface="굴림" panose="020B0600000101010101" pitchFamily="50" charset="-127"/>
+              </a:rPr>
+              <a:t>&lt; </a:t>
+            </a:r>
+            <a:r>
+              <a:rPr lang="ko-KR" altLang="en-US" b="1" kern="0" dirty="0">
+                <a:solidFill>
+                  <a:srgbClr val="000000"/>
+                </a:solidFill>
+                <a:latin typeface="굴림" panose="020B0600000101010101" pitchFamily="50" charset="-127"/>
+                <a:ea typeface="굴림" panose="020B0600000101010101" pitchFamily="50" charset="-127"/>
+              </a:rPr>
+              <a:t>가게 정보 수정 화면 </a:t>
+            </a:r>
+            <a:r>
+              <a:rPr lang="en-US" altLang="ko-KR" b="1" kern="0" dirty="0">
+                <a:solidFill>
+                  <a:srgbClr val="000000"/>
+                </a:solidFill>
+                <a:latin typeface="굴림" panose="020B0600000101010101" pitchFamily="50" charset="-127"/>
+                <a:ea typeface="굴림" panose="020B0600000101010101" pitchFamily="50" charset="-127"/>
+              </a:rPr>
+              <a:t>&gt;</a:t>
+            </a:r>
+            <a:endParaRPr lang="ko-KR" altLang="en-US" b="1" kern="0" dirty="0">
+              <a:solidFill>
+                <a:srgbClr val="000000"/>
+              </a:solidFill>
+              <a:latin typeface="함초롬바탕" panose="02030604000101010101" pitchFamily="18" charset="-127"/>
+              <a:ea typeface="굴림" panose="020B0600000101010101" pitchFamily="50" charset="-127"/>
+            </a:endParaRPr>
+          </a:p>
+          <a:p>
+            <a:pPr algn="just" fontAlgn="base">
+              <a:lnSpc>
+                <a:spcPct val="160000"/>
+              </a:lnSpc>
+            </a:pPr>
+            <a:r>
+              <a:rPr lang="ko-KR" altLang="en-US" b="1" kern="0" dirty="0">
+                <a:solidFill>
+                  <a:srgbClr val="000000"/>
+                </a:solidFill>
+                <a:latin typeface="굴림" panose="020B0600000101010101" pitchFamily="50" charset="-127"/>
+                <a:ea typeface="굴림" panose="020B0600000101010101" pitchFamily="50" charset="-127"/>
+              </a:rPr>
+              <a:t>가게 정보를 수정하는 기능입니다</a:t>
+            </a:r>
+            <a:r>
+              <a:rPr lang="en-US" altLang="ko-KR" b="1" kern="0" dirty="0" smtClean="0">
+                <a:solidFill>
+                  <a:srgbClr val="000000"/>
+                </a:solidFill>
+                <a:latin typeface="굴림" panose="020B0600000101010101" pitchFamily="50" charset="-127"/>
+                <a:ea typeface="굴림" panose="020B0600000101010101" pitchFamily="50" charset="-127"/>
+              </a:rPr>
+              <a:t>.</a:t>
+            </a:r>
+            <a:endParaRPr lang="en-US" altLang="ko-KR" sz="1050" b="1" kern="0" spc="0" dirty="0">
+              <a:solidFill>
+                <a:srgbClr val="000000"/>
+              </a:solidFill>
+              <a:effectLst/>
+              <a:latin typeface="굴림" panose="020B0600000101010101" pitchFamily="50" charset="-127"/>
+              <a:ea typeface="굴림" panose="020B0600000101010101" pitchFamily="50" charset="-127"/>
+            </a:endParaRPr>
+          </a:p>
+          <a:p>
+            <a:pPr algn="just" fontAlgn="base">
+              <a:lnSpc>
+                <a:spcPct val="160000"/>
+              </a:lnSpc>
+            </a:pPr>
+            <a:r>
+              <a:rPr lang="ko-KR" altLang="en-US" b="1" kern="0" dirty="0" smtClean="0">
+                <a:solidFill>
+                  <a:srgbClr val="000000"/>
+                </a:solidFill>
+                <a:latin typeface="굴림" panose="020B0600000101010101" pitchFamily="50" charset="-127"/>
+                <a:ea typeface="굴림" panose="020B0600000101010101" pitchFamily="50" charset="-127"/>
+              </a:rPr>
+              <a:t>또한 가게의 대표 사진을 설정 </a:t>
+            </a:r>
+            <a:endParaRPr lang="en-US" altLang="ko-KR" b="1" kern="0" dirty="0" smtClean="0">
+              <a:solidFill>
+                <a:srgbClr val="000000"/>
+              </a:solidFill>
+              <a:latin typeface="굴림" panose="020B0600000101010101" pitchFamily="50" charset="-127"/>
+              <a:ea typeface="굴림" panose="020B0600000101010101" pitchFamily="50" charset="-127"/>
+            </a:endParaRPr>
+          </a:p>
+          <a:p>
+            <a:pPr algn="just" fontAlgn="base">
+              <a:lnSpc>
+                <a:spcPct val="160000"/>
+              </a:lnSpc>
+            </a:pPr>
+            <a:r>
+              <a:rPr lang="ko-KR" altLang="en-US" b="1" kern="0" dirty="0" smtClean="0">
+                <a:solidFill>
+                  <a:srgbClr val="000000"/>
+                </a:solidFill>
+                <a:latin typeface="굴림" panose="020B0600000101010101" pitchFamily="50" charset="-127"/>
+                <a:ea typeface="굴림" panose="020B0600000101010101" pitchFamily="50" charset="-127"/>
+              </a:rPr>
+              <a:t>해놓을 수 있습니다</a:t>
+            </a:r>
+            <a:r>
+              <a:rPr lang="en-US" altLang="ko-KR" b="1" kern="0" dirty="0" smtClean="0">
+                <a:solidFill>
+                  <a:srgbClr val="000000"/>
+                </a:solidFill>
+                <a:latin typeface="굴림" panose="020B0600000101010101" pitchFamily="50" charset="-127"/>
+                <a:ea typeface="굴림" panose="020B0600000101010101" pitchFamily="50" charset="-127"/>
+              </a:rPr>
+              <a:t>.</a:t>
+            </a:r>
+            <a:endParaRPr lang="ko-KR" altLang="en-US" kern="0" spc="0" dirty="0" smtClean="0">
+              <a:solidFill>
+                <a:srgbClr val="000000"/>
+              </a:solidFill>
+              <a:effectLst/>
+              <a:latin typeface="함초롬바탕" panose="02030604000101010101" pitchFamily="18" charset="-127"/>
+            </a:endParaRPr>
+          </a:p>
+          <a:p>
+            <a:pPr algn="just" fontAlgn="base">
+              <a:lnSpc>
+                <a:spcPct val="160000"/>
+              </a:lnSpc>
+            </a:pPr>
+            <a:r>
+              <a:rPr lang="ko-KR" altLang="en-US" b="1" kern="0" dirty="0">
+                <a:solidFill>
+                  <a:srgbClr val="000000"/>
+                </a:solidFill>
+                <a:latin typeface="굴림" panose="020B0600000101010101" pitchFamily="50" charset="-127"/>
+                <a:ea typeface="굴림" panose="020B0600000101010101" pitchFamily="50" charset="-127"/>
+              </a:rPr>
+              <a:t>처음에 미리 적어놓은 정보들이 </a:t>
+            </a:r>
+            <a:endParaRPr lang="en-US" altLang="ko-KR" b="1" kern="0" dirty="0" smtClean="0">
+              <a:solidFill>
+                <a:srgbClr val="000000"/>
+              </a:solidFill>
+              <a:latin typeface="굴림" panose="020B0600000101010101" pitchFamily="50" charset="-127"/>
+              <a:ea typeface="굴림" panose="020B0600000101010101" pitchFamily="50" charset="-127"/>
+            </a:endParaRPr>
+          </a:p>
+          <a:p>
+            <a:pPr algn="just" fontAlgn="base">
+              <a:lnSpc>
+                <a:spcPct val="160000"/>
+              </a:lnSpc>
+            </a:pPr>
+            <a:r>
+              <a:rPr lang="ko-KR" altLang="en-US" b="1" kern="0" dirty="0" smtClean="0">
+                <a:solidFill>
+                  <a:srgbClr val="000000"/>
+                </a:solidFill>
+                <a:latin typeface="굴림" panose="020B0600000101010101" pitchFamily="50" charset="-127"/>
+                <a:ea typeface="굴림" panose="020B0600000101010101" pitchFamily="50" charset="-127"/>
+              </a:rPr>
+              <a:t>출력됩니다</a:t>
+            </a:r>
+            <a:r>
+              <a:rPr lang="en-US" altLang="ko-KR" b="1" kern="0" dirty="0">
+                <a:solidFill>
+                  <a:srgbClr val="000000"/>
+                </a:solidFill>
+                <a:latin typeface="굴림" panose="020B0600000101010101" pitchFamily="50" charset="-127"/>
+                <a:ea typeface="굴림" panose="020B0600000101010101" pitchFamily="50" charset="-127"/>
+              </a:rPr>
+              <a:t>.</a:t>
+            </a:r>
+            <a:endParaRPr lang="ko-KR" altLang="en-US" sz="1050" kern="0" spc="0" dirty="0" smtClean="0">
+              <a:solidFill>
+                <a:srgbClr val="000000"/>
+              </a:solidFill>
+              <a:effectLst/>
+              <a:latin typeface="함초롬바탕" panose="02030604000101010101" pitchFamily="18" charset="-127"/>
+            </a:endParaRPr>
+          </a:p>
+          <a:p>
+            <a:pPr algn="just" fontAlgn="base">
+              <a:lnSpc>
+                <a:spcPct val="160000"/>
+              </a:lnSpc>
+            </a:pPr>
+            <a:r>
+              <a:rPr lang="ko-KR" altLang="en-US" b="1" kern="0" dirty="0">
+                <a:solidFill>
+                  <a:srgbClr val="000000"/>
+                </a:solidFill>
+                <a:latin typeface="굴림" panose="020B0600000101010101" pitchFamily="50" charset="-127"/>
+                <a:ea typeface="굴림" panose="020B0600000101010101" pitchFamily="50" charset="-127"/>
+              </a:rPr>
+              <a:t>수정 후 변경하기를 누르시면 내용이 </a:t>
+            </a:r>
+            <a:endParaRPr lang="en-US" altLang="ko-KR" b="1" kern="0" dirty="0" smtClean="0">
+              <a:solidFill>
+                <a:srgbClr val="000000"/>
+              </a:solidFill>
+              <a:latin typeface="굴림" panose="020B0600000101010101" pitchFamily="50" charset="-127"/>
+              <a:ea typeface="굴림" panose="020B0600000101010101" pitchFamily="50" charset="-127"/>
+            </a:endParaRPr>
+          </a:p>
+          <a:p>
+            <a:pPr algn="just" fontAlgn="base">
+              <a:lnSpc>
+                <a:spcPct val="160000"/>
+              </a:lnSpc>
+            </a:pPr>
+            <a:r>
+              <a:rPr lang="ko-KR" altLang="en-US" b="1" kern="0" dirty="0" smtClean="0">
+                <a:solidFill>
+                  <a:srgbClr val="000000"/>
+                </a:solidFill>
+                <a:latin typeface="굴림" panose="020B0600000101010101" pitchFamily="50" charset="-127"/>
+                <a:ea typeface="굴림" panose="020B0600000101010101" pitchFamily="50" charset="-127"/>
+              </a:rPr>
+              <a:t>변경 </a:t>
+            </a:r>
+            <a:r>
+              <a:rPr lang="ko-KR" altLang="en-US" b="1" kern="0" dirty="0">
+                <a:solidFill>
+                  <a:srgbClr val="000000"/>
+                </a:solidFill>
+                <a:latin typeface="굴림" panose="020B0600000101010101" pitchFamily="50" charset="-127"/>
+                <a:ea typeface="굴림" panose="020B0600000101010101" pitchFamily="50" charset="-127"/>
+              </a:rPr>
+              <a:t>됩니다</a:t>
+            </a:r>
+            <a:r>
+              <a:rPr lang="en-US" altLang="ko-KR" b="1" kern="0" dirty="0">
+                <a:solidFill>
+                  <a:srgbClr val="000000"/>
+                </a:solidFill>
+                <a:latin typeface="굴림" panose="020B0600000101010101" pitchFamily="50" charset="-127"/>
+                <a:ea typeface="굴림" panose="020B0600000101010101" pitchFamily="50" charset="-127"/>
+              </a:rPr>
+              <a:t>.</a:t>
+            </a:r>
+            <a:endParaRPr lang="ko-KR" altLang="en-US" sz="1050" kern="0" spc="0" dirty="0">
+              <a:solidFill>
+                <a:srgbClr val="000000"/>
+              </a:solidFill>
+              <a:effectLst/>
+              <a:latin typeface="함초롬바탕" panose="02030604000101010101" pitchFamily="18" charset="-127"/>
+            </a:endParaRPr>
+          </a:p>
+        </p:txBody>
+      </p:sp>
       <p:pic>
         <p:nvPicPr>
-          <p:cNvPr id="4" name="그림 3"/>
+          <p:cNvPr id="2" name="그림 1"/>
           <p:cNvPicPr>
             <a:picLocks noChangeAspect="1"/>
           </p:cNvPicPr>
@@ -5928,182 +6218,44 @@
         </p:blipFill>
         <p:spPr>
           <a:xfrm>
-            <a:off x="1202761" y="280219"/>
-            <a:ext cx="3467715" cy="6164826"/>
+            <a:off x="4167188" y="457200"/>
+            <a:ext cx="3268460" cy="5810597"/>
           </a:xfrm>
           <a:prstGeom prst="rect">
             <a:avLst/>
           </a:prstGeom>
         </p:spPr>
       </p:pic>
-      <p:sp>
-        <p:nvSpPr>
-          <p:cNvPr id="5" name="직사각형 4"/>
-          <p:cNvSpPr/>
+      <p:pic>
+        <p:nvPicPr>
+          <p:cNvPr id="3" name="그림 2"/>
+          <p:cNvPicPr>
+            <a:picLocks noChangeAspect="1"/>
+          </p:cNvPicPr>
           <p:nvPr/>
-        </p:nvSpPr>
+        </p:nvPicPr>
+        <p:blipFill>
+          <a:blip r:embed="rId3" cstate="print">
+            <a:extLst>
+              <a:ext uri="{28A0092B-C50C-407E-A947-70E740481C1C}">
+                <a14:useLocalDpi xmlns:a14="http://schemas.microsoft.com/office/drawing/2010/main" val="0"/>
+              </a:ext>
+            </a:extLst>
+          </a:blip>
+          <a:stretch>
+            <a:fillRect/>
+          </a:stretch>
+        </p:blipFill>
         <p:spPr>
           <a:xfrm>
-            <a:off x="4935793" y="280219"/>
-            <a:ext cx="6096000" cy="1865126"/>
+            <a:off x="576089" y="457201"/>
+            <a:ext cx="3268460" cy="5810596"/>
           </a:xfrm>
           <a:prstGeom prst="rect">
             <a:avLst/>
           </a:prstGeom>
         </p:spPr>
-        <p:txBody>
-          <a:bodyPr>
-            <a:spAutoFit/>
-          </a:bodyPr>
-          <a:lstStyle/>
-          <a:p>
-            <a:pPr algn="just" fontAlgn="base">
-              <a:lnSpc>
-                <a:spcPct val="160000"/>
-              </a:lnSpc>
-            </a:pPr>
-            <a:r>
-              <a:rPr lang="en-US" altLang="ko-KR" b="1" kern="0" dirty="0">
-                <a:solidFill>
-                  <a:srgbClr val="000000"/>
-                </a:solidFill>
-                <a:latin typeface="굴림" panose="020B0600000101010101" pitchFamily="50" charset="-127"/>
-                <a:ea typeface="굴림" panose="020B0600000101010101" pitchFamily="50" charset="-127"/>
-              </a:rPr>
-              <a:t>&lt; </a:t>
-            </a:r>
-            <a:r>
-              <a:rPr lang="ko-KR" altLang="en-US" b="1" kern="0" dirty="0">
-                <a:solidFill>
-                  <a:srgbClr val="000000"/>
-                </a:solidFill>
-                <a:latin typeface="굴림" panose="020B0600000101010101" pitchFamily="50" charset="-127"/>
-                <a:ea typeface="굴림" panose="020B0600000101010101" pitchFamily="50" charset="-127"/>
-              </a:rPr>
-              <a:t>가게 정보 수정 화면 </a:t>
-            </a:r>
-            <a:r>
-              <a:rPr lang="en-US" altLang="ko-KR" b="1" kern="0" dirty="0">
-                <a:solidFill>
-                  <a:srgbClr val="000000"/>
-                </a:solidFill>
-                <a:latin typeface="굴림" panose="020B0600000101010101" pitchFamily="50" charset="-127"/>
-                <a:ea typeface="굴림" panose="020B0600000101010101" pitchFamily="50" charset="-127"/>
-              </a:rPr>
-              <a:t>&gt;</a:t>
-            </a:r>
-            <a:endParaRPr lang="ko-KR" altLang="en-US" b="1" kern="0" dirty="0">
-              <a:solidFill>
-                <a:srgbClr val="000000"/>
-              </a:solidFill>
-              <a:latin typeface="함초롬바탕" panose="02030604000101010101" pitchFamily="18" charset="-127"/>
-              <a:ea typeface="굴림" panose="020B0600000101010101" pitchFamily="50" charset="-127"/>
-            </a:endParaRPr>
-          </a:p>
-          <a:p>
-            <a:pPr algn="just" fontAlgn="base">
-              <a:lnSpc>
-                <a:spcPct val="160000"/>
-              </a:lnSpc>
-            </a:pPr>
-            <a:r>
-              <a:rPr lang="ko-KR" altLang="en-US" b="1" kern="0" dirty="0">
-                <a:solidFill>
-                  <a:srgbClr val="000000"/>
-                </a:solidFill>
-                <a:latin typeface="굴림" panose="020B0600000101010101" pitchFamily="50" charset="-127"/>
-                <a:ea typeface="굴림" panose="020B0600000101010101" pitchFamily="50" charset="-127"/>
-              </a:rPr>
-              <a:t>가게 정보를 수정하는 기능입니다</a:t>
-            </a:r>
-            <a:r>
-              <a:rPr lang="en-US" altLang="ko-KR" b="1" kern="0" dirty="0">
-                <a:solidFill>
-                  <a:srgbClr val="000000"/>
-                </a:solidFill>
-                <a:latin typeface="굴림" panose="020B0600000101010101" pitchFamily="50" charset="-127"/>
-                <a:ea typeface="굴림" panose="020B0600000101010101" pitchFamily="50" charset="-127"/>
-              </a:rPr>
-              <a:t>.</a:t>
-            </a:r>
-            <a:endParaRPr lang="ko-KR" altLang="en-US" sz="1050" kern="0" spc="0" dirty="0" smtClean="0">
-              <a:solidFill>
-                <a:srgbClr val="000000"/>
-              </a:solidFill>
-              <a:effectLst/>
-              <a:latin typeface="함초롬바탕" panose="02030604000101010101" pitchFamily="18" charset="-127"/>
-            </a:endParaRPr>
-          </a:p>
-          <a:p>
-            <a:pPr algn="just" fontAlgn="base">
-              <a:lnSpc>
-                <a:spcPct val="160000"/>
-              </a:lnSpc>
-            </a:pPr>
-            <a:r>
-              <a:rPr lang="ko-KR" altLang="en-US" b="1" kern="0" dirty="0">
-                <a:solidFill>
-                  <a:srgbClr val="000000"/>
-                </a:solidFill>
-                <a:latin typeface="굴림" panose="020B0600000101010101" pitchFamily="50" charset="-127"/>
-                <a:ea typeface="굴림" panose="020B0600000101010101" pitchFamily="50" charset="-127"/>
-              </a:rPr>
-              <a:t>처음에 미리 적어놓은 정보들이 출력됩니다</a:t>
-            </a:r>
-            <a:r>
-              <a:rPr lang="en-US" altLang="ko-KR" b="1" kern="0" dirty="0">
-                <a:solidFill>
-                  <a:srgbClr val="000000"/>
-                </a:solidFill>
-                <a:latin typeface="굴림" panose="020B0600000101010101" pitchFamily="50" charset="-127"/>
-                <a:ea typeface="굴림" panose="020B0600000101010101" pitchFamily="50" charset="-127"/>
-              </a:rPr>
-              <a:t>.</a:t>
-            </a:r>
-            <a:endParaRPr lang="ko-KR" altLang="en-US" sz="1050" kern="0" spc="0" dirty="0" smtClean="0">
-              <a:solidFill>
-                <a:srgbClr val="000000"/>
-              </a:solidFill>
-              <a:effectLst/>
-              <a:latin typeface="함초롬바탕" panose="02030604000101010101" pitchFamily="18" charset="-127"/>
-            </a:endParaRPr>
-          </a:p>
-          <a:p>
-            <a:pPr algn="just" fontAlgn="base">
-              <a:lnSpc>
-                <a:spcPct val="160000"/>
-              </a:lnSpc>
-            </a:pPr>
-            <a:r>
-              <a:rPr lang="ko-KR" altLang="en-US" b="1" kern="0" dirty="0">
-                <a:solidFill>
-                  <a:srgbClr val="000000"/>
-                </a:solidFill>
-                <a:latin typeface="굴림" panose="020B0600000101010101" pitchFamily="50" charset="-127"/>
-                <a:ea typeface="굴림" panose="020B0600000101010101" pitchFamily="50" charset="-127"/>
-              </a:rPr>
-              <a:t>수정 후 변경하기를 누르시면 내용이 변경 됩니다</a:t>
-            </a:r>
-            <a:r>
-              <a:rPr lang="en-US" altLang="ko-KR" b="1" kern="0" dirty="0">
-                <a:solidFill>
-                  <a:srgbClr val="000000"/>
-                </a:solidFill>
-                <a:latin typeface="굴림" panose="020B0600000101010101" pitchFamily="50" charset="-127"/>
-                <a:ea typeface="굴림" panose="020B0600000101010101" pitchFamily="50" charset="-127"/>
-              </a:rPr>
-              <a:t>.</a:t>
-            </a:r>
-            <a:endParaRPr lang="ko-KR" altLang="en-US" sz="1050" kern="0" spc="0" dirty="0">
-              <a:solidFill>
-                <a:srgbClr val="000000"/>
-              </a:solidFill>
-              <a:effectLst/>
-              <a:latin typeface="함초롬바탕" panose="02030604000101010101" pitchFamily="18" charset="-127"/>
-            </a:endParaRPr>
-          </a:p>
-        </p:txBody>
-      </p:sp>
+      </p:pic>
     </p:spTree>
     <p:extLst>
       <p:ext uri="{BB962C8B-B14F-4D97-AF65-F5344CB8AC3E}">

</xml_diff>